<commit_message>
new staging script, all solutions refactored to use nested stacks, documentation consistency
</commit_message>
<xml_diff>
--- a/aws_sra_examples/solutions/cloudtrail/cloudtrail_org/documentation/sra-cloudtrail-org.pptx
+++ b/aws_sra_examples/solutions/cloudtrail/cloudtrail_org/documentation/sra-cloudtrail-org.pptx
@@ -259,7 +259,7 @@
           <a:p>
             <a:fld id="{E5B0E223-1B92-604B-9DB5-409A30BBDC46}" type="datetimeFigureOut">
               <a:rPr lang="en-US" smtClean="0"/>
-              <a:t>11/15/21</a:t>
+              <a:t>3/7/22</a:t>
             </a:fld>
             <a:endParaRPr lang="en-US"/>
           </a:p>
@@ -457,7 +457,7 @@
           <a:p>
             <a:fld id="{E5B0E223-1B92-604B-9DB5-409A30BBDC46}" type="datetimeFigureOut">
               <a:rPr lang="en-US" smtClean="0"/>
-              <a:t>11/15/21</a:t>
+              <a:t>3/7/22</a:t>
             </a:fld>
             <a:endParaRPr lang="en-US"/>
           </a:p>
@@ -665,7 +665,7 @@
           <a:p>
             <a:fld id="{E5B0E223-1B92-604B-9DB5-409A30BBDC46}" type="datetimeFigureOut">
               <a:rPr lang="en-US" smtClean="0"/>
-              <a:t>11/15/21</a:t>
+              <a:t>3/7/22</a:t>
             </a:fld>
             <a:endParaRPr lang="en-US"/>
           </a:p>
@@ -863,7 +863,7 @@
           <a:p>
             <a:fld id="{E5B0E223-1B92-604B-9DB5-409A30BBDC46}" type="datetimeFigureOut">
               <a:rPr lang="en-US" smtClean="0"/>
-              <a:t>11/15/21</a:t>
+              <a:t>3/7/22</a:t>
             </a:fld>
             <a:endParaRPr lang="en-US"/>
           </a:p>
@@ -1138,7 +1138,7 @@
           <a:p>
             <a:fld id="{E5B0E223-1B92-604B-9DB5-409A30BBDC46}" type="datetimeFigureOut">
               <a:rPr lang="en-US" smtClean="0"/>
-              <a:t>11/15/21</a:t>
+              <a:t>3/7/22</a:t>
             </a:fld>
             <a:endParaRPr lang="en-US"/>
           </a:p>
@@ -1403,7 +1403,7 @@
           <a:p>
             <a:fld id="{E5B0E223-1B92-604B-9DB5-409A30BBDC46}" type="datetimeFigureOut">
               <a:rPr lang="en-US" smtClean="0"/>
-              <a:t>11/15/21</a:t>
+              <a:t>3/7/22</a:t>
             </a:fld>
             <a:endParaRPr lang="en-US"/>
           </a:p>
@@ -1815,7 +1815,7 @@
           <a:p>
             <a:fld id="{E5B0E223-1B92-604B-9DB5-409A30BBDC46}" type="datetimeFigureOut">
               <a:rPr lang="en-US" smtClean="0"/>
-              <a:t>11/15/21</a:t>
+              <a:t>3/7/22</a:t>
             </a:fld>
             <a:endParaRPr lang="en-US"/>
           </a:p>
@@ -1956,7 +1956,7 @@
           <a:p>
             <a:fld id="{E5B0E223-1B92-604B-9DB5-409A30BBDC46}" type="datetimeFigureOut">
               <a:rPr lang="en-US" smtClean="0"/>
-              <a:t>11/15/21</a:t>
+              <a:t>3/7/22</a:t>
             </a:fld>
             <a:endParaRPr lang="en-US"/>
           </a:p>
@@ -2069,7 +2069,7 @@
           <a:p>
             <a:fld id="{E5B0E223-1B92-604B-9DB5-409A30BBDC46}" type="datetimeFigureOut">
               <a:rPr lang="en-US" smtClean="0"/>
-              <a:t>11/15/21</a:t>
+              <a:t>3/7/22</a:t>
             </a:fld>
             <a:endParaRPr lang="en-US"/>
           </a:p>
@@ -2380,7 +2380,7 @@
           <a:p>
             <a:fld id="{E5B0E223-1B92-604B-9DB5-409A30BBDC46}" type="datetimeFigureOut">
               <a:rPr lang="en-US" smtClean="0"/>
-              <a:t>11/15/21</a:t>
+              <a:t>3/7/22</a:t>
             </a:fld>
             <a:endParaRPr lang="en-US"/>
           </a:p>
@@ -2668,7 +2668,7 @@
           <a:p>
             <a:fld id="{E5B0E223-1B92-604B-9DB5-409A30BBDC46}" type="datetimeFigureOut">
               <a:rPr lang="en-US" smtClean="0"/>
-              <a:t>11/15/21</a:t>
+              <a:t>3/7/22</a:t>
             </a:fld>
             <a:endParaRPr lang="en-US"/>
           </a:p>
@@ -2909,7 +2909,7 @@
           <a:p>
             <a:fld id="{E5B0E223-1B92-604B-9DB5-409A30BBDC46}" type="datetimeFigureOut">
               <a:rPr lang="en-US" smtClean="0"/>
-              <a:t>11/15/21</a:t>
+              <a:t>3/7/22</a:t>
             </a:fld>
             <a:endParaRPr lang="en-US"/>
           </a:p>
@@ -3340,8 +3340,8 @@
         </p:nvSpPr>
         <p:spPr>
           <a:xfrm>
-            <a:off x="2365043" y="248055"/>
-            <a:ext cx="7453360" cy="6037085"/>
+            <a:off x="2871263" y="496605"/>
+            <a:ext cx="6956248" cy="5656441"/>
           </a:xfrm>
           <a:prstGeom prst="rect">
             <a:avLst/>
@@ -3513,7 +3513,7 @@
         </p:blipFill>
         <p:spPr>
           <a:xfrm>
-            <a:off x="2360897" y="248055"/>
+            <a:off x="2873710" y="496605"/>
             <a:ext cx="330200" cy="330200"/>
           </a:xfrm>
           <a:prstGeom prst="rect">
@@ -3535,8 +3535,8 @@
         </p:nvSpPr>
         <p:spPr>
           <a:xfrm>
-            <a:off x="2558575" y="3718193"/>
-            <a:ext cx="3630659" cy="2434128"/>
+            <a:off x="3010778" y="4214378"/>
+            <a:ext cx="3245405" cy="1826242"/>
           </a:xfrm>
           <a:prstGeom prst="rect">
             <a:avLst/>
@@ -3589,14 +3589,14 @@
           <a:p>
             <a:pPr algn="ctr"/>
             <a:r>
-              <a:rPr lang="en-US" sz="1400" dirty="0">
+              <a:rPr lang="en-US" sz="1200" dirty="0">
                 <a:solidFill>
                   <a:schemeClr val="tx1"/>
                 </a:solidFill>
                 <a:latin typeface="Arial" panose="020B0604020202020204" pitchFamily="34" charset="0"/>
                 <a:cs typeface="Arial" panose="020B0604020202020204" pitchFamily="34" charset="0"/>
               </a:rPr>
-              <a:t>OU: Core</a:t>
+              <a:t>OU: Security</a:t>
             </a:r>
           </a:p>
         </p:txBody>
@@ -3615,8 +3615,8 @@
         </p:nvSpPr>
         <p:spPr>
           <a:xfrm>
-            <a:off x="6323771" y="3718193"/>
-            <a:ext cx="3318107" cy="2434128"/>
+            <a:off x="6375588" y="4214378"/>
+            <a:ext cx="3319324" cy="1826242"/>
           </a:xfrm>
           <a:prstGeom prst="rect">
             <a:avLst/>
@@ -3663,20 +3663,20 @@
                 <a:latin typeface="Arial" panose="020B0604020202020204" pitchFamily="34" charset="0"/>
                 <a:cs typeface="Arial" panose="020B0604020202020204" pitchFamily="34" charset="0"/>
               </a:rPr>
-              <a:t>Security Log Archive Account</a:t>
+              <a:t>Log Archive Account</a:t>
             </a:r>
           </a:p>
           <a:p>
             <a:pPr algn="ctr"/>
             <a:r>
-              <a:rPr lang="en-US" sz="1400" dirty="0">
+              <a:rPr lang="en-US" sz="1200" dirty="0">
                 <a:solidFill>
                   <a:schemeClr val="tx1"/>
                 </a:solidFill>
                 <a:latin typeface="Arial" panose="020B0604020202020204" pitchFamily="34" charset="0"/>
                 <a:cs typeface="Arial" panose="020B0604020202020204" pitchFamily="34" charset="0"/>
               </a:rPr>
-              <a:t>OU: Core</a:t>
+              <a:t>OU: Security</a:t>
             </a:r>
           </a:p>
         </p:txBody>
@@ -3695,8 +3695,8 @@
         </p:nvSpPr>
         <p:spPr>
           <a:xfrm>
-            <a:off x="3192783" y="596045"/>
-            <a:ext cx="5992901" cy="3020413"/>
+            <a:off x="3903267" y="873894"/>
+            <a:ext cx="4928818" cy="3238172"/>
           </a:xfrm>
           <a:prstGeom prst="rect">
             <a:avLst/>
@@ -3746,19 +3746,6 @@
               <a:t>Organization Management Account</a:t>
             </a:r>
           </a:p>
-          <a:p>
-            <a:pPr algn="ctr"/>
-            <a:r>
-              <a:rPr lang="en-US" sz="1400" dirty="0">
-                <a:solidFill>
-                  <a:schemeClr val="tx1"/>
-                </a:solidFill>
-                <a:latin typeface="Arial" panose="020B0604020202020204" pitchFamily="34" charset="0"/>
-                <a:cs typeface="Arial" panose="020B0604020202020204" pitchFamily="34" charset="0"/>
-              </a:rPr>
-              <a:t>OU: management</a:t>
-            </a:r>
-          </a:p>
         </p:txBody>
       </p:sp>
       <p:pic>
@@ -3789,8 +3776,8 @@
         </p:blipFill>
         <p:spPr>
           <a:xfrm>
-            <a:off x="7318392" y="1228935"/>
-            <a:ext cx="555156" cy="555156"/>
+            <a:off x="7868829" y="2159019"/>
+            <a:ext cx="457200" cy="457200"/>
           </a:xfrm>
           <a:prstGeom prst="rect">
             <a:avLst/>
@@ -3811,7 +3798,7 @@
         </p:nvSpPr>
         <p:spPr>
           <a:xfrm>
-            <a:off x="7036773" y="1793047"/>
+            <a:off x="7548456" y="2603646"/>
             <a:ext cx="1143813" cy="261610"/>
           </a:xfrm>
           <a:prstGeom prst="rect">
@@ -3836,42 +3823,6 @@
           </a:p>
         </p:txBody>
       </p:sp>
-      <p:pic>
-        <p:nvPicPr>
-          <p:cNvPr id="12" name="Graphic 1">
-            <a:extLst>
-              <a:ext uri="{FF2B5EF4-FFF2-40B4-BE49-F238E27FC236}">
-                <a16:creationId xmlns:a16="http://schemas.microsoft.com/office/drawing/2014/main" id="{E0D38807-A8CD-1442-BF58-774081CEF0EA}"/>
-              </a:ext>
-            </a:extLst>
-          </p:cNvPr>
-          <p:cNvPicPr>
-            <a:picLocks noChangeAspect="1"/>
-          </p:cNvPicPr>
-          <p:nvPr/>
-        </p:nvPicPr>
-        <p:blipFill>
-          <a:blip r:embed="rId6">
-            <a:extLst>
-              <a:ext uri="{96DAC541-7B7A-43D3-8B79-37D633B846F1}">
-                <asvg:svgBlip xmlns:asvg="http://schemas.microsoft.com/office/drawing/2016/SVG/main" r:embed="rId7"/>
-              </a:ext>
-            </a:extLst>
-          </a:blip>
-          <a:stretch>
-            <a:fillRect/>
-          </a:stretch>
-        </p:blipFill>
-        <p:spPr>
-          <a:xfrm>
-            <a:off x="7333385" y="2498613"/>
-            <a:ext cx="555156" cy="555156"/>
-          </a:xfrm>
-          <a:prstGeom prst="rect">
-            <a:avLst/>
-          </a:prstGeom>
-        </p:spPr>
-      </p:pic>
       <p:sp>
         <p:nvSpPr>
           <p:cNvPr id="13" name="TextBox 2">
@@ -3886,8 +3837,8 @@
         </p:nvSpPr>
         <p:spPr>
           <a:xfrm>
-            <a:off x="6697996" y="3062329"/>
-            <a:ext cx="1773919" cy="430887"/>
+            <a:off x="7558367" y="3496492"/>
+            <a:ext cx="1123992" cy="430887"/>
           </a:xfrm>
           <a:prstGeom prst="rect">
             <a:avLst/>
@@ -3982,16 +3933,6 @@
                 <a:latin typeface="Arial" panose="020B0604020202020204" pitchFamily="34" charset="0"/>
                 <a:cs typeface="Arial" panose="020B0604020202020204" pitchFamily="34" charset="0"/>
               </a:rPr>
-              <a:t>CloudTrail </a:t>
-            </a:r>
-          </a:p>
-          <a:p>
-            <a:pPr algn="ctr"/>
-            <a:r>
-              <a:rPr lang="en-US" sz="1100" dirty="0">
-                <a:latin typeface="Arial" panose="020B0604020202020204" pitchFamily="34" charset="0"/>
-                <a:cs typeface="Arial" panose="020B0604020202020204" pitchFamily="34" charset="0"/>
-              </a:rPr>
               <a:t>CloudWatch Log Group</a:t>
             </a:r>
           </a:p>
@@ -4012,10 +3953,10 @@
           <p:nvPr/>
         </p:nvPicPr>
         <p:blipFill>
-          <a:blip r:embed="rId8">
+          <a:blip r:embed="rId6">
             <a:extLst>
               <a:ext uri="{96DAC541-7B7A-43D3-8B79-37D633B846F1}">
-                <asvg:svgBlip xmlns:asvg="http://schemas.microsoft.com/office/drawing/2016/SVG/main" r:embed="rId9"/>
+                <asvg:svgBlip xmlns:asvg="http://schemas.microsoft.com/office/drawing/2016/SVG/main" r:embed="rId7"/>
               </a:ext>
             </a:extLst>
           </a:blip>
@@ -4025,8 +3966,8 @@
         </p:blipFill>
         <p:spPr>
           <a:xfrm>
-            <a:off x="4746703" y="4678754"/>
-            <a:ext cx="555157" cy="555157"/>
+            <a:off x="4482551" y="4976430"/>
+            <a:ext cx="457200" cy="457200"/>
           </a:xfrm>
           <a:prstGeom prst="rect">
             <a:avLst/>
@@ -4047,8 +3988,8 @@
         </p:nvSpPr>
         <p:spPr>
           <a:xfrm>
-            <a:off x="4232698" y="5283401"/>
-            <a:ext cx="1545649" cy="430887"/>
+            <a:off x="4139738" y="5431822"/>
+            <a:ext cx="1142826" cy="430887"/>
           </a:xfrm>
           <a:prstGeom prst="rect">
             <a:avLst/>
@@ -4143,47 +4084,11 @@
                 <a:latin typeface="Arial" panose="020B0604020202020204" pitchFamily="34" charset="0"/>
                 <a:cs typeface="Arial" panose="020B0604020202020204" pitchFamily="34" charset="0"/>
               </a:rPr>
-              <a:t>Organization CloudTrail KMS Key</a:t>
-            </a:r>
-          </a:p>
-        </p:txBody>
-      </p:sp>
-      <p:pic>
-        <p:nvPicPr>
-          <p:cNvPr id="19" name="Graphic 1">
-            <a:extLst>
-              <a:ext uri="{FF2B5EF4-FFF2-40B4-BE49-F238E27FC236}">
-                <a16:creationId xmlns:a16="http://schemas.microsoft.com/office/drawing/2014/main" id="{80E3B2E7-AA48-6F43-B2D3-3729C166DBF3}"/>
-              </a:ext>
-            </a:extLst>
-          </p:cNvPr>
-          <p:cNvPicPr>
-            <a:picLocks noChangeAspect="1"/>
-          </p:cNvPicPr>
-          <p:nvPr/>
-        </p:nvPicPr>
-        <p:blipFill>
-          <a:blip r:embed="rId10">
-            <a:extLst>
-              <a:ext uri="{96DAC541-7B7A-43D3-8B79-37D633B846F1}">
-                <asvg:svgBlip xmlns:asvg="http://schemas.microsoft.com/office/drawing/2016/SVG/main" r:embed="rId11"/>
-              </a:ext>
-            </a:extLst>
-          </a:blip>
-          <a:stretch>
-            <a:fillRect/>
-          </a:stretch>
-        </p:blipFill>
-        <p:spPr>
-          <a:xfrm>
-            <a:off x="8488373" y="4692868"/>
-            <a:ext cx="555156" cy="555156"/>
-          </a:xfrm>
-          <a:prstGeom prst="rect">
-            <a:avLst/>
-          </a:prstGeom>
-        </p:spPr>
-      </p:pic>
+              <a:t>CloudTrail KMS Key</a:t>
+            </a:r>
+          </a:p>
+        </p:txBody>
+      </p:sp>
       <p:sp>
         <p:nvSpPr>
           <p:cNvPr id="20" name="TextBox 2">
@@ -4198,8 +4103,8 @@
         </p:nvSpPr>
         <p:spPr>
           <a:xfrm>
-            <a:off x="8139056" y="5256980"/>
-            <a:ext cx="1205503" cy="600164"/>
+            <a:off x="7671251" y="5393497"/>
+            <a:ext cx="827407" cy="261610"/>
           </a:xfrm>
           <a:prstGeom prst="rect">
             <a:avLst/>
@@ -4294,7 +4199,7 @@
                 <a:latin typeface="Arial" panose="020B0604020202020204" pitchFamily="34" charset="0"/>
                 <a:cs typeface="Arial" panose="020B0604020202020204" pitchFamily="34" charset="0"/>
               </a:rPr>
-              <a:t>Organization CloudTrail Bucket</a:t>
+              <a:t>S3 Bucket</a:t>
             </a:r>
           </a:p>
         </p:txBody>
@@ -4313,7 +4218,7 @@
         </p:nvSpPr>
         <p:spPr>
           <a:xfrm>
-            <a:off x="4890340" y="1823104"/>
+            <a:off x="5400908" y="2523578"/>
             <a:ext cx="1427732" cy="261610"/>
           </a:xfrm>
           <a:prstGeom prst="rect">
@@ -4409,47 +4314,11 @@
                 <a:latin typeface="Arial" panose="020B0604020202020204" pitchFamily="34" charset="0"/>
                 <a:cs typeface="Arial" panose="020B0604020202020204" pitchFamily="34" charset="0"/>
               </a:rPr>
-              <a:t>AWS Lambda</a:t>
-            </a:r>
-          </a:p>
-        </p:txBody>
-      </p:sp>
-      <p:pic>
-        <p:nvPicPr>
-          <p:cNvPr id="25" name="Graphic 1">
-            <a:extLst>
-              <a:ext uri="{FF2B5EF4-FFF2-40B4-BE49-F238E27FC236}">
-                <a16:creationId xmlns:a16="http://schemas.microsoft.com/office/drawing/2014/main" id="{F0ED1C47-F712-174C-A812-DF5294AB3EBE}"/>
-              </a:ext>
-            </a:extLst>
-          </p:cNvPr>
-          <p:cNvPicPr>
-            <a:picLocks noChangeAspect="1"/>
-          </p:cNvPicPr>
-          <p:nvPr/>
-        </p:nvPicPr>
-        <p:blipFill>
-          <a:blip r:embed="rId6">
-            <a:extLst>
-              <a:ext uri="{96DAC541-7B7A-43D3-8B79-37D633B846F1}">
-                <asvg:svgBlip xmlns:asvg="http://schemas.microsoft.com/office/drawing/2016/SVG/main" r:embed="rId7"/>
-              </a:ext>
-            </a:extLst>
-          </a:blip>
-          <a:stretch>
-            <a:fillRect/>
-          </a:stretch>
-        </p:blipFill>
-        <p:spPr>
-          <a:xfrm>
-            <a:off x="5349437" y="2498613"/>
-            <a:ext cx="555156" cy="555156"/>
-          </a:xfrm>
-          <a:prstGeom prst="rect">
-            <a:avLst/>
-          </a:prstGeom>
-        </p:spPr>
-      </p:pic>
+              <a:t>Lambda Function</a:t>
+            </a:r>
+          </a:p>
+        </p:txBody>
+      </p:sp>
       <p:sp>
         <p:nvSpPr>
           <p:cNvPr id="26" name="TextBox 2">
@@ -4464,8 +4333,8 @@
         </p:nvSpPr>
         <p:spPr>
           <a:xfrm>
-            <a:off x="4845014" y="3053769"/>
-            <a:ext cx="1578705" cy="430887"/>
+            <a:off x="5466954" y="3503216"/>
+            <a:ext cx="1103001" cy="430887"/>
           </a:xfrm>
           <a:prstGeom prst="rect">
             <a:avLst/>
@@ -4560,17 +4429,56 @@
                 <a:latin typeface="Arial" panose="020B0604020202020204" pitchFamily="34" charset="0"/>
                 <a:cs typeface="Arial" panose="020B0604020202020204" pitchFamily="34" charset="0"/>
               </a:rPr>
-              <a:t>Lambda CloudWatch Log Group</a:t>
+              <a:t>CloudWatch Log Group</a:t>
+            </a:r>
+          </a:p>
+        </p:txBody>
+      </p:sp>
+      <p:sp>
+        <p:nvSpPr>
+          <p:cNvPr id="28" name="TextBox 27">
+            <a:extLst>
+              <a:ext uri="{FF2B5EF4-FFF2-40B4-BE49-F238E27FC236}">
+                <a16:creationId xmlns:a16="http://schemas.microsoft.com/office/drawing/2014/main" id="{87C80F56-7337-084F-A922-E2DD22E3AB2D}"/>
+              </a:ext>
+            </a:extLst>
+          </p:cNvPr>
+          <p:cNvSpPr txBox="1"/>
+          <p:nvPr/>
+        </p:nvSpPr>
+        <p:spPr>
+          <a:xfrm>
+            <a:off x="5502712" y="1581451"/>
+            <a:ext cx="1103001" cy="261610"/>
+          </a:xfrm>
+          <a:prstGeom prst="rect">
+            <a:avLst/>
+          </a:prstGeom>
+          <a:noFill/>
+        </p:spPr>
+        <p:txBody>
+          <a:bodyPr wrap="square" rtlCol="0">
+            <a:spAutoFit/>
+          </a:bodyPr>
+          <a:lstStyle/>
+          <a:p>
+            <a:pPr algn="ctr"/>
+            <a:r>
+              <a:rPr lang="en-US" sz="1100" dirty="0">
+                <a:latin typeface="Arial" panose="020B0604020202020204" pitchFamily="34" charset="0"/>
+                <a:cs typeface="Arial" panose="020B0604020202020204" pitchFamily="34" charset="0"/>
+              </a:rPr>
+              <a:t>Lambda Role</a:t>
             </a:r>
           </a:p>
         </p:txBody>
       </p:sp>
       <p:pic>
         <p:nvPicPr>
-          <p:cNvPr id="27" name="Graphic 26">
-            <a:extLst>
-              <a:ext uri="{FF2B5EF4-FFF2-40B4-BE49-F238E27FC236}">
-                <a16:creationId xmlns:a16="http://schemas.microsoft.com/office/drawing/2014/main" id="{AE1F99A4-7570-0E40-A4C6-A3D9D7011286}"/>
+          <p:cNvPr id="29" name="Graphic 28">
+            <a:extLst>
+              <a:ext uri="{FF2B5EF4-FFF2-40B4-BE49-F238E27FC236}">
+                <a16:creationId xmlns:a16="http://schemas.microsoft.com/office/drawing/2014/main" id="{0A41393E-D1A0-DC45-AF2C-FC996863891B}"/>
               </a:ext>
             </a:extLst>
           </p:cNvPr>
@@ -4580,10 +4488,10 @@
           <p:nvPr/>
         </p:nvPicPr>
         <p:blipFill>
-          <a:blip r:embed="rId12">
+          <a:blip r:embed="rId8">
             <a:extLst>
               <a:ext uri="{96DAC541-7B7A-43D3-8B79-37D633B846F1}">
-                <asvg:svgBlip xmlns:asvg="http://schemas.microsoft.com/office/drawing/2016/SVG/main" r:embed="rId13"/>
+                <asvg:svgBlip xmlns:asvg="http://schemas.microsoft.com/office/drawing/2016/SVG/main" r:embed="rId9"/>
               </a:ext>
             </a:extLst>
           </a:blip>
@@ -4593,8 +4501,8 @@
         </p:blipFill>
         <p:spPr>
           <a:xfrm>
-            <a:off x="5326628" y="1228935"/>
-            <a:ext cx="555156" cy="555156"/>
+            <a:off x="5811600" y="1249002"/>
+            <a:ext cx="469900" cy="469900"/>
           </a:xfrm>
           <a:prstGeom prst="rect">
             <a:avLst/>
@@ -4603,10 +4511,10 @@
       </p:pic>
       <p:sp>
         <p:nvSpPr>
-          <p:cNvPr id="28" name="TextBox 27">
-            <a:extLst>
-              <a:ext uri="{FF2B5EF4-FFF2-40B4-BE49-F238E27FC236}">
-                <a16:creationId xmlns:a16="http://schemas.microsoft.com/office/drawing/2014/main" id="{87C80F56-7337-084F-A922-E2DD22E3AB2D}"/>
+          <p:cNvPr id="30" name="TextBox 29">
+            <a:extLst>
+              <a:ext uri="{FF2B5EF4-FFF2-40B4-BE49-F238E27FC236}">
+                <a16:creationId xmlns:a16="http://schemas.microsoft.com/office/drawing/2014/main" id="{DEF1EA1E-079E-1943-91D5-3521ECB671F3}"/>
               </a:ext>
             </a:extLst>
           </p:cNvPr>
@@ -4615,8 +4523,8 @@
         </p:nvSpPr>
         <p:spPr>
           <a:xfrm>
-            <a:off x="5963148" y="2291914"/>
-            <a:ext cx="1103001" cy="261610"/>
+            <a:off x="7500846" y="1600442"/>
+            <a:ext cx="1219143" cy="261610"/>
           </a:xfrm>
           <a:prstGeom prst="rect">
             <a:avLst/>
@@ -4635,17 +4543,17 @@
                 <a:latin typeface="Arial" panose="020B0604020202020204" pitchFamily="34" charset="0"/>
                 <a:cs typeface="Arial" panose="020B0604020202020204" pitchFamily="34" charset="0"/>
               </a:rPr>
-              <a:t>Lambda Role</a:t>
+              <a:t>Log Group Role</a:t>
             </a:r>
           </a:p>
         </p:txBody>
       </p:sp>
       <p:pic>
         <p:nvPicPr>
-          <p:cNvPr id="29" name="Graphic 28">
-            <a:extLst>
-              <a:ext uri="{FF2B5EF4-FFF2-40B4-BE49-F238E27FC236}">
-                <a16:creationId xmlns:a16="http://schemas.microsoft.com/office/drawing/2014/main" id="{0A41393E-D1A0-DC45-AF2C-FC996863891B}"/>
+          <p:cNvPr id="31" name="Graphic 30">
+            <a:extLst>
+              <a:ext uri="{FF2B5EF4-FFF2-40B4-BE49-F238E27FC236}">
+                <a16:creationId xmlns:a16="http://schemas.microsoft.com/office/drawing/2014/main" id="{B6E8919B-F978-8C48-B136-276A746164EF}"/>
               </a:ext>
             </a:extLst>
           </p:cNvPr>
@@ -4655,10 +4563,10 @@
           <p:nvPr/>
         </p:nvPicPr>
         <p:blipFill>
-          <a:blip r:embed="rId14">
+          <a:blip r:embed="rId8">
             <a:extLst>
               <a:ext uri="{96DAC541-7B7A-43D3-8B79-37D633B846F1}">
-                <asvg:svgBlip xmlns:asvg="http://schemas.microsoft.com/office/drawing/2016/SVG/main" r:embed="rId15"/>
+                <asvg:svgBlip xmlns:asvg="http://schemas.microsoft.com/office/drawing/2016/SVG/main" r:embed="rId9"/>
               </a:ext>
             </a:extLst>
           </a:blip>
@@ -4668,8 +4576,8 @@
         </p:blipFill>
         <p:spPr>
           <a:xfrm>
-            <a:off x="6237754" y="1891097"/>
-            <a:ext cx="469900" cy="469900"/>
+            <a:off x="7837740" y="1290846"/>
+            <a:ext cx="519379" cy="469900"/>
           </a:xfrm>
           <a:prstGeom prst="rect">
             <a:avLst/>
@@ -4678,10 +4586,10 @@
       </p:pic>
       <p:sp>
         <p:nvSpPr>
-          <p:cNvPr id="30" name="TextBox 29">
-            <a:extLst>
-              <a:ext uri="{FF2B5EF4-FFF2-40B4-BE49-F238E27FC236}">
-                <a16:creationId xmlns:a16="http://schemas.microsoft.com/office/drawing/2014/main" id="{DEF1EA1E-079E-1943-91D5-3521ECB671F3}"/>
+          <p:cNvPr id="35" name="TextBox 34">
+            <a:extLst>
+              <a:ext uri="{FF2B5EF4-FFF2-40B4-BE49-F238E27FC236}">
+                <a16:creationId xmlns:a16="http://schemas.microsoft.com/office/drawing/2014/main" id="{3ECF5BF4-90EE-7543-B53F-20106F407FD7}"/>
               </a:ext>
             </a:extLst>
           </p:cNvPr>
@@ -4690,8 +4598,8 @@
         </p:nvSpPr>
         <p:spPr>
           <a:xfrm>
-            <a:off x="7937720" y="2284031"/>
-            <a:ext cx="1103001" cy="430887"/>
+            <a:off x="4130072" y="2977407"/>
+            <a:ext cx="1307240" cy="430887"/>
           </a:xfrm>
           <a:prstGeom prst="rect">
             <a:avLst/>
@@ -4710,17 +4618,17 @@
                 <a:latin typeface="Arial" panose="020B0604020202020204" pitchFamily="34" charset="0"/>
                 <a:cs typeface="Arial" panose="020B0604020202020204" pitchFamily="34" charset="0"/>
               </a:rPr>
-              <a:t>Log Group Role</a:t>
+              <a:t>AWS CloudFormation</a:t>
             </a:r>
           </a:p>
         </p:txBody>
       </p:sp>
       <p:pic>
         <p:nvPicPr>
-          <p:cNvPr id="31" name="Graphic 30">
-            <a:extLst>
-              <a:ext uri="{FF2B5EF4-FFF2-40B4-BE49-F238E27FC236}">
-                <a16:creationId xmlns:a16="http://schemas.microsoft.com/office/drawing/2014/main" id="{B6E8919B-F978-8C48-B136-276A746164EF}"/>
+          <p:cNvPr id="36" name="Graphic 35">
+            <a:extLst>
+              <a:ext uri="{FF2B5EF4-FFF2-40B4-BE49-F238E27FC236}">
+                <a16:creationId xmlns:a16="http://schemas.microsoft.com/office/drawing/2014/main" id="{F3F17F92-5C34-9443-A0B1-080A54E9E04D}"/>
               </a:ext>
             </a:extLst>
           </p:cNvPr>
@@ -4730,10 +4638,10 @@
           <p:nvPr/>
         </p:nvPicPr>
         <p:blipFill>
-          <a:blip r:embed="rId14">
+          <a:blip r:embed="rId10">
             <a:extLst>
               <a:ext uri="{96DAC541-7B7A-43D3-8B79-37D633B846F1}">
-                <asvg:svgBlip xmlns:asvg="http://schemas.microsoft.com/office/drawing/2016/SVG/main" r:embed="rId15"/>
+                <asvg:svgBlip xmlns:asvg="http://schemas.microsoft.com/office/drawing/2016/SVG/main" r:embed="rId11"/>
               </a:ext>
             </a:extLst>
           </a:blip>
@@ -4743,224 +4651,14 @@
         </p:blipFill>
         <p:spPr>
           <a:xfrm>
-            <a:off x="8207951" y="1881268"/>
-            <a:ext cx="469900" cy="469900"/>
+            <a:off x="4556548" y="2537727"/>
+            <a:ext cx="457200" cy="457200"/>
           </a:xfrm>
           <a:prstGeom prst="rect">
             <a:avLst/>
           </a:prstGeom>
         </p:spPr>
       </p:pic>
-      <p:cxnSp>
-        <p:nvCxnSpPr>
-          <p:cNvPr id="32" name="Straight Arrow Connector 31">
-            <a:extLst>
-              <a:ext uri="{FF2B5EF4-FFF2-40B4-BE49-F238E27FC236}">
-                <a16:creationId xmlns:a16="http://schemas.microsoft.com/office/drawing/2014/main" id="{D59D280F-7885-E043-BB4B-6F6B44570708}"/>
-              </a:ext>
-            </a:extLst>
-          </p:cNvPr>
-          <p:cNvCxnSpPr>
-            <a:cxnSpLocks/>
-          </p:cNvCxnSpPr>
-          <p:nvPr/>
-        </p:nvCxnSpPr>
-        <p:spPr>
-          <a:xfrm>
-            <a:off x="6139776" y="1509156"/>
-            <a:ext cx="835165" cy="0"/>
-          </a:xfrm>
-          <a:prstGeom prst="straightConnector1">
-            <a:avLst/>
-          </a:prstGeom>
-          <a:ln w="12700">
-            <a:solidFill>
-              <a:srgbClr val="545B64"/>
-            </a:solidFill>
-            <a:headEnd type="none" w="med" len="sm"/>
-            <a:tailEnd type="arrow" w="med" len="sm"/>
-          </a:ln>
-        </p:spPr>
-        <p:style>
-          <a:lnRef idx="1">
-            <a:schemeClr val="accent1"/>
-          </a:lnRef>
-          <a:fillRef idx="0">
-            <a:schemeClr val="accent1"/>
-          </a:fillRef>
-          <a:effectRef idx="0">
-            <a:schemeClr val="accent1"/>
-          </a:effectRef>
-          <a:fontRef idx="minor">
-            <a:schemeClr val="tx1"/>
-          </a:fontRef>
-        </p:style>
-      </p:cxnSp>
-      <p:cxnSp>
-        <p:nvCxnSpPr>
-          <p:cNvPr id="33" name="Straight Arrow Connector 32">
-            <a:extLst>
-              <a:ext uri="{FF2B5EF4-FFF2-40B4-BE49-F238E27FC236}">
-                <a16:creationId xmlns:a16="http://schemas.microsoft.com/office/drawing/2014/main" id="{02FFE816-DE32-3E4D-8DB7-5096164CC4EC}"/>
-              </a:ext>
-            </a:extLst>
-          </p:cNvPr>
-          <p:cNvCxnSpPr>
-            <a:cxnSpLocks/>
-          </p:cNvCxnSpPr>
-          <p:nvPr/>
-        </p:nvCxnSpPr>
-        <p:spPr>
-          <a:xfrm>
-            <a:off x="5598513" y="2065616"/>
-            <a:ext cx="0" cy="356001"/>
-          </a:xfrm>
-          <a:prstGeom prst="straightConnector1">
-            <a:avLst/>
-          </a:prstGeom>
-          <a:ln w="12700">
-            <a:solidFill>
-              <a:srgbClr val="545B64"/>
-            </a:solidFill>
-            <a:headEnd type="none" w="med" len="sm"/>
-            <a:tailEnd type="arrow" w="med" len="sm"/>
-          </a:ln>
-        </p:spPr>
-        <p:style>
-          <a:lnRef idx="1">
-            <a:schemeClr val="accent1"/>
-          </a:lnRef>
-          <a:fillRef idx="0">
-            <a:schemeClr val="accent1"/>
-          </a:fillRef>
-          <a:effectRef idx="0">
-            <a:schemeClr val="accent1"/>
-          </a:effectRef>
-          <a:fontRef idx="minor">
-            <a:schemeClr val="tx1"/>
-          </a:fontRef>
-        </p:style>
-      </p:cxnSp>
-      <p:cxnSp>
-        <p:nvCxnSpPr>
-          <p:cNvPr id="34" name="Straight Arrow Connector 33">
-            <a:extLst>
-              <a:ext uri="{FF2B5EF4-FFF2-40B4-BE49-F238E27FC236}">
-                <a16:creationId xmlns:a16="http://schemas.microsoft.com/office/drawing/2014/main" id="{0071B262-3EF1-1D40-A9F6-1575369E58F4}"/>
-              </a:ext>
-            </a:extLst>
-          </p:cNvPr>
-          <p:cNvCxnSpPr>
-            <a:cxnSpLocks/>
-          </p:cNvCxnSpPr>
-          <p:nvPr/>
-        </p:nvCxnSpPr>
-        <p:spPr>
-          <a:xfrm>
-            <a:off x="7618624" y="2065616"/>
-            <a:ext cx="0" cy="356001"/>
-          </a:xfrm>
-          <a:prstGeom prst="straightConnector1">
-            <a:avLst/>
-          </a:prstGeom>
-          <a:ln w="12700">
-            <a:solidFill>
-              <a:srgbClr val="545B64"/>
-            </a:solidFill>
-            <a:headEnd type="none" w="med" len="sm"/>
-            <a:tailEnd type="arrow" w="med" len="sm"/>
-          </a:ln>
-        </p:spPr>
-        <p:style>
-          <a:lnRef idx="1">
-            <a:schemeClr val="accent1"/>
-          </a:lnRef>
-          <a:fillRef idx="0">
-            <a:schemeClr val="accent1"/>
-          </a:fillRef>
-          <a:effectRef idx="0">
-            <a:schemeClr val="accent1"/>
-          </a:effectRef>
-          <a:fontRef idx="minor">
-            <a:schemeClr val="tx1"/>
-          </a:fontRef>
-        </p:style>
-      </p:cxnSp>
-      <p:sp>
-        <p:nvSpPr>
-          <p:cNvPr id="35" name="TextBox 34">
-            <a:extLst>
-              <a:ext uri="{FF2B5EF4-FFF2-40B4-BE49-F238E27FC236}">
-                <a16:creationId xmlns:a16="http://schemas.microsoft.com/office/drawing/2014/main" id="{3ECF5BF4-90EE-7543-B53F-20106F407FD7}"/>
-              </a:ext>
-            </a:extLst>
-          </p:cNvPr>
-          <p:cNvSpPr txBox="1"/>
-          <p:nvPr/>
-        </p:nvSpPr>
-        <p:spPr>
-          <a:xfrm>
-            <a:off x="3192783" y="2300967"/>
-            <a:ext cx="1307240" cy="430887"/>
-          </a:xfrm>
-          <a:prstGeom prst="rect">
-            <a:avLst/>
-          </a:prstGeom>
-          <a:noFill/>
-        </p:spPr>
-        <p:txBody>
-          <a:bodyPr wrap="square" rtlCol="0">
-            <a:spAutoFit/>
-          </a:bodyPr>
-          <a:lstStyle/>
-          <a:p>
-            <a:pPr algn="ctr"/>
-            <a:r>
-              <a:rPr lang="en-US" sz="1100" dirty="0">
-                <a:latin typeface="Arial" panose="020B0604020202020204" pitchFamily="34" charset="0"/>
-                <a:cs typeface="Arial" panose="020B0604020202020204" pitchFamily="34" charset="0"/>
-              </a:rPr>
-              <a:t>AWS CloudFormation</a:t>
-            </a:r>
-          </a:p>
-        </p:txBody>
-      </p:sp>
-      <p:pic>
-        <p:nvPicPr>
-          <p:cNvPr id="36" name="Graphic 35">
-            <a:extLst>
-              <a:ext uri="{FF2B5EF4-FFF2-40B4-BE49-F238E27FC236}">
-                <a16:creationId xmlns:a16="http://schemas.microsoft.com/office/drawing/2014/main" id="{F3F17F92-5C34-9443-A0B1-080A54E9E04D}"/>
-              </a:ext>
-            </a:extLst>
-          </p:cNvPr>
-          <p:cNvPicPr>
-            <a:picLocks noChangeAspect="1"/>
-          </p:cNvPicPr>
-          <p:nvPr/>
-        </p:nvPicPr>
-        <p:blipFill>
-          <a:blip r:embed="rId16">
-            <a:extLst>
-              <a:ext uri="{96DAC541-7B7A-43D3-8B79-37D633B846F1}">
-                <asvg:svgBlip xmlns:asvg="http://schemas.microsoft.com/office/drawing/2016/SVG/main" r:embed="rId17"/>
-              </a:ext>
-            </a:extLst>
-          </a:blip>
-          <a:stretch>
-            <a:fillRect/>
-          </a:stretch>
-        </p:blipFill>
-        <p:spPr>
-          <a:xfrm>
-            <a:off x="3568825" y="1712573"/>
-            <a:ext cx="555156" cy="555156"/>
-          </a:xfrm>
-          <a:prstGeom prst="rect">
-            <a:avLst/>
-          </a:prstGeom>
-        </p:spPr>
-      </p:pic>
       <p:sp>
         <p:nvSpPr>
           <p:cNvPr id="37" name="Rectangle 36">
@@ -4975,8 +4673,8 @@
         </p:nvSpPr>
         <p:spPr>
           <a:xfrm>
-            <a:off x="4936526" y="1141073"/>
-            <a:ext cx="4076830" cy="2372158"/>
+            <a:off x="4027534" y="1854595"/>
+            <a:ext cx="4692455" cy="2108325"/>
           </a:xfrm>
           <a:prstGeom prst="rect">
             <a:avLst/>
@@ -4984,7 +4682,7 @@
           <a:noFill/>
           <a:ln w="12700">
             <a:solidFill>
-              <a:srgbClr val="5A6B86"/>
+              <a:schemeClr val="tx1"/>
             </a:solidFill>
             <a:prstDash val="dash"/>
           </a:ln>
@@ -5006,7 +4704,7 @@
           </a:fontRef>
         </p:style>
         <p:txBody>
-          <a:bodyPr rot="0" spcFirstLastPara="0" vertOverflow="overflow" horzOverflow="overflow" vert="horz" wrap="square" lIns="91440" tIns="91440" rIns="91440" bIns="45720" numCol="1" spcCol="0" rtlCol="0" fromWordArt="0" anchor="t" anchorCtr="0" forceAA="0" compatLnSpc="1">
+          <a:bodyPr rot="0" spcFirstLastPara="0" vertOverflow="overflow" horzOverflow="overflow" vert="horz" wrap="square" lIns="91440" tIns="0" rIns="91440" bIns="45720" numCol="1" spcCol="0" rtlCol="0" fromWordArt="0" anchor="t" anchorCtr="0" forceAA="0" compatLnSpc="1">
             <a:prstTxWarp prst="textNoShape">
               <a:avLst/>
             </a:prstTxWarp>
@@ -5014,10 +4712,19 @@
           </a:bodyPr>
           <a:lstStyle/>
           <a:p>
-            <a:pPr algn="ctr"/>
-            <a:endParaRPr lang="en-US" sz="1400" dirty="0">
+            <a:r>
+              <a:rPr lang="en-US" sz="1100" b="1" dirty="0">
+                <a:solidFill>
+                  <a:schemeClr val="tx1"/>
+                </a:solidFill>
+                <a:latin typeface="Arial" panose="020B0604020202020204" pitchFamily="34" charset="0"/>
+                <a:cs typeface="Arial" panose="020B0604020202020204" pitchFamily="34" charset="0"/>
+              </a:rPr>
+              <a:t>Home-region</a:t>
+            </a:r>
+            <a:endParaRPr lang="en-US" sz="1400" b="1" dirty="0">
               <a:solidFill>
-                <a:srgbClr val="5A6B86"/>
+                <a:schemeClr val="tx1"/>
               </a:solidFill>
               <a:latin typeface="Arial" panose="020B0604020202020204" pitchFamily="34" charset="0"/>
               <a:cs typeface="Arial" panose="020B0604020202020204" pitchFamily="34" charset="0"/>
@@ -5025,51 +4732,6 @@
           </a:p>
         </p:txBody>
       </p:sp>
-      <p:cxnSp>
-        <p:nvCxnSpPr>
-          <p:cNvPr id="38" name="Straight Arrow Connector 37">
-            <a:extLst>
-              <a:ext uri="{FF2B5EF4-FFF2-40B4-BE49-F238E27FC236}">
-                <a16:creationId xmlns:a16="http://schemas.microsoft.com/office/drawing/2014/main" id="{3E6479C6-1CE1-4443-9BA2-526727005BF6}"/>
-              </a:ext>
-            </a:extLst>
-          </p:cNvPr>
-          <p:cNvCxnSpPr>
-            <a:cxnSpLocks/>
-          </p:cNvCxnSpPr>
-          <p:nvPr/>
-        </p:nvCxnSpPr>
-        <p:spPr>
-          <a:xfrm>
-            <a:off x="4279562" y="1997420"/>
-            <a:ext cx="486285" cy="0"/>
-          </a:xfrm>
-          <a:prstGeom prst="straightConnector1">
-            <a:avLst/>
-          </a:prstGeom>
-          <a:ln w="12700">
-            <a:solidFill>
-              <a:srgbClr val="545B64"/>
-            </a:solidFill>
-            <a:headEnd type="none" w="med" len="sm"/>
-            <a:tailEnd type="arrow" w="med" len="sm"/>
-          </a:ln>
-        </p:spPr>
-        <p:style>
-          <a:lnRef idx="1">
-            <a:schemeClr val="accent1"/>
-          </a:lnRef>
-          <a:fillRef idx="0">
-            <a:schemeClr val="accent1"/>
-          </a:fillRef>
-          <a:effectRef idx="0">
-            <a:schemeClr val="accent1"/>
-          </a:effectRef>
-          <a:fontRef idx="minor">
-            <a:schemeClr val="tx1"/>
-          </a:fontRef>
-        </p:style>
-      </p:cxnSp>
       <p:sp>
         <p:nvSpPr>
           <p:cNvPr id="40" name="TextBox 39">
@@ -5084,8 +4746,8 @@
         </p:nvSpPr>
         <p:spPr>
           <a:xfrm>
-            <a:off x="6293755" y="5325369"/>
-            <a:ext cx="1338281" cy="430887"/>
+            <a:off x="6464380" y="5416245"/>
+            <a:ext cx="1180988" cy="430887"/>
           </a:xfrm>
           <a:prstGeom prst="rect">
             <a:avLst/>
@@ -5124,10 +4786,10 @@
           <p:nvPr/>
         </p:nvPicPr>
         <p:blipFill>
-          <a:blip r:embed="rId16">
+          <a:blip r:embed="rId10">
             <a:extLst>
               <a:ext uri="{96DAC541-7B7A-43D3-8B79-37D633B846F1}">
-                <asvg:svgBlip xmlns:asvg="http://schemas.microsoft.com/office/drawing/2016/SVG/main" r:embed="rId17"/>
+                <asvg:svgBlip xmlns:asvg="http://schemas.microsoft.com/office/drawing/2016/SVG/main" r:embed="rId11"/>
               </a:ext>
             </a:extLst>
           </a:blip>
@@ -5137,8 +4799,8 @@
         </p:blipFill>
         <p:spPr>
           <a:xfrm>
-            <a:off x="6690708" y="4752469"/>
-            <a:ext cx="555156" cy="555156"/>
+            <a:off x="6823721" y="4972435"/>
+            <a:ext cx="457200" cy="457200"/>
           </a:xfrm>
           <a:prstGeom prst="rect">
             <a:avLst/>
@@ -5159,7 +4821,7 @@
         </p:nvSpPr>
         <p:spPr>
           <a:xfrm>
-            <a:off x="2548724" y="5251654"/>
+            <a:off x="3042075" y="5422902"/>
             <a:ext cx="1282714" cy="430887"/>
           </a:xfrm>
           <a:prstGeom prst="rect">
@@ -5199,10 +4861,10 @@
           <p:nvPr/>
         </p:nvPicPr>
         <p:blipFill>
-          <a:blip r:embed="rId16">
+          <a:blip r:embed="rId10">
             <a:extLst>
               <a:ext uri="{96DAC541-7B7A-43D3-8B79-37D633B846F1}">
-                <asvg:svgBlip xmlns:asvg="http://schemas.microsoft.com/office/drawing/2016/SVG/main" r:embed="rId17"/>
+                <asvg:svgBlip xmlns:asvg="http://schemas.microsoft.com/office/drawing/2016/SVG/main" r:embed="rId11"/>
               </a:ext>
             </a:extLst>
           </a:blip>
@@ -5212,8 +4874,8 @@
         </p:blipFill>
         <p:spPr>
           <a:xfrm>
-            <a:off x="2940910" y="4678754"/>
-            <a:ext cx="555156" cy="555156"/>
+            <a:off x="3454832" y="4975586"/>
+            <a:ext cx="457200" cy="457200"/>
           </a:xfrm>
           <a:prstGeom prst="rect">
             <a:avLst/>
@@ -5234,8 +4896,8 @@
         </p:nvSpPr>
         <p:spPr>
           <a:xfrm>
-            <a:off x="4182158" y="4462742"/>
-            <a:ext cx="1791298" cy="1574853"/>
+            <a:off x="3114269" y="4726238"/>
+            <a:ext cx="3032719" cy="1183227"/>
           </a:xfrm>
           <a:prstGeom prst="rect">
             <a:avLst/>
@@ -5243,7 +4905,7 @@
           <a:noFill/>
           <a:ln w="12700">
             <a:solidFill>
-              <a:srgbClr val="5A6B86"/>
+              <a:schemeClr val="tx1"/>
             </a:solidFill>
             <a:prstDash val="dash"/>
           </a:ln>
@@ -5265,7 +4927,7 @@
           </a:fontRef>
         </p:style>
         <p:txBody>
-          <a:bodyPr rot="0" spcFirstLastPara="0" vertOverflow="overflow" horzOverflow="overflow" vert="horz" wrap="square" lIns="91440" tIns="91440" rIns="91440" bIns="45720" numCol="1" spcCol="0" rtlCol="0" fromWordArt="0" anchor="t" anchorCtr="0" forceAA="0" compatLnSpc="1">
+          <a:bodyPr rot="0" spcFirstLastPara="0" vertOverflow="overflow" horzOverflow="overflow" vert="horz" wrap="square" lIns="91440" tIns="0" rIns="91440" bIns="45720" numCol="1" spcCol="0" rtlCol="0" fromWordArt="0" anchor="t" anchorCtr="0" forceAA="0" compatLnSpc="1">
             <a:prstTxWarp prst="textNoShape">
               <a:avLst/>
             </a:prstTxWarp>
@@ -5273,62 +4935,19 @@
           </a:bodyPr>
           <a:lstStyle/>
           <a:p>
-            <a:pPr algn="ctr"/>
-            <a:endParaRPr lang="en-US" sz="1400" dirty="0">
-              <a:solidFill>
-                <a:srgbClr val="5A6B86"/>
-              </a:solidFill>
-              <a:latin typeface="Arial" panose="020B0604020202020204" pitchFamily="34" charset="0"/>
-              <a:cs typeface="Arial" panose="020B0604020202020204" pitchFamily="34" charset="0"/>
-            </a:endParaRPr>
-          </a:p>
-        </p:txBody>
-      </p:sp>
-      <p:cxnSp>
-        <p:nvCxnSpPr>
-          <p:cNvPr id="45" name="Straight Arrow Connector 44">
-            <a:extLst>
-              <a:ext uri="{FF2B5EF4-FFF2-40B4-BE49-F238E27FC236}">
-                <a16:creationId xmlns:a16="http://schemas.microsoft.com/office/drawing/2014/main" id="{6250F97E-8E43-114A-BD04-519860FD6E0D}"/>
-              </a:ext>
-            </a:extLst>
-          </p:cNvPr>
-          <p:cNvCxnSpPr>
-            <a:cxnSpLocks/>
-          </p:cNvCxnSpPr>
-          <p:nvPr/>
-        </p:nvCxnSpPr>
-        <p:spPr>
-          <a:xfrm>
-            <a:off x="3632642" y="4964913"/>
-            <a:ext cx="486285" cy="0"/>
-          </a:xfrm>
-          <a:prstGeom prst="straightConnector1">
-            <a:avLst/>
-          </a:prstGeom>
-          <a:ln w="12700">
-            <a:solidFill>
-              <a:srgbClr val="545B64"/>
-            </a:solidFill>
-            <a:headEnd type="none" w="med" len="sm"/>
-            <a:tailEnd type="arrow" w="med" len="sm"/>
-          </a:ln>
-        </p:spPr>
-        <p:style>
-          <a:lnRef idx="1">
-            <a:schemeClr val="accent1"/>
-          </a:lnRef>
-          <a:fillRef idx="0">
-            <a:schemeClr val="accent1"/>
-          </a:fillRef>
-          <a:effectRef idx="0">
-            <a:schemeClr val="accent1"/>
-          </a:effectRef>
-          <a:fontRef idx="minor">
-            <a:schemeClr val="tx1"/>
-          </a:fontRef>
-        </p:style>
-      </p:cxnSp>
+            <a:r>
+              <a:rPr lang="en-US" sz="1100" b="1" dirty="0">
+                <a:solidFill>
+                  <a:schemeClr val="tx1"/>
+                </a:solidFill>
+                <a:latin typeface="Arial" panose="020B0604020202020204" pitchFamily="34" charset="0"/>
+                <a:cs typeface="Arial" panose="020B0604020202020204" pitchFamily="34" charset="0"/>
+              </a:rPr>
+              <a:t>Home-region</a:t>
+            </a:r>
+          </a:p>
+        </p:txBody>
+      </p:sp>
       <p:sp>
         <p:nvSpPr>
           <p:cNvPr id="46" name="Rectangle 45">
@@ -5343,8 +4962,8 @@
         </p:nvSpPr>
         <p:spPr>
           <a:xfrm>
-            <a:off x="7977664" y="4462742"/>
-            <a:ext cx="1495335" cy="1574854"/>
+            <a:off x="6499338" y="4726238"/>
+            <a:ext cx="3072301" cy="1183227"/>
           </a:xfrm>
           <a:prstGeom prst="rect">
             <a:avLst/>
@@ -5352,7 +4971,7 @@
           <a:noFill/>
           <a:ln w="12700">
             <a:solidFill>
-              <a:srgbClr val="5A6B86"/>
+              <a:schemeClr val="tx1"/>
             </a:solidFill>
             <a:prstDash val="dash"/>
           </a:ln>
@@ -5374,7 +4993,7 @@
           </a:fontRef>
         </p:style>
         <p:txBody>
-          <a:bodyPr rot="0" spcFirstLastPara="0" vertOverflow="overflow" horzOverflow="overflow" vert="horz" wrap="square" lIns="91440" tIns="91440" rIns="91440" bIns="45720" numCol="1" spcCol="0" rtlCol="0" fromWordArt="0" anchor="t" anchorCtr="0" forceAA="0" compatLnSpc="1">
+          <a:bodyPr rot="0" spcFirstLastPara="0" vertOverflow="overflow" horzOverflow="overflow" vert="horz" wrap="square" lIns="91440" tIns="0" rIns="91440" bIns="45720" numCol="1" spcCol="0" rtlCol="0" fromWordArt="0" anchor="t" anchorCtr="0" forceAA="0" compatLnSpc="1">
             <a:prstTxWarp prst="textNoShape">
               <a:avLst/>
             </a:prstTxWarp>
@@ -5382,62 +5001,19 @@
           </a:bodyPr>
           <a:lstStyle/>
           <a:p>
-            <a:pPr algn="ctr"/>
-            <a:endParaRPr lang="en-US" sz="1400" dirty="0">
-              <a:solidFill>
-                <a:srgbClr val="5A6B86"/>
-              </a:solidFill>
-              <a:latin typeface="Arial" panose="020B0604020202020204" pitchFamily="34" charset="0"/>
-              <a:cs typeface="Arial" panose="020B0604020202020204" pitchFamily="34" charset="0"/>
-            </a:endParaRPr>
-          </a:p>
-        </p:txBody>
-      </p:sp>
-      <p:cxnSp>
-        <p:nvCxnSpPr>
-          <p:cNvPr id="47" name="Straight Arrow Connector 46">
-            <a:extLst>
-              <a:ext uri="{FF2B5EF4-FFF2-40B4-BE49-F238E27FC236}">
-                <a16:creationId xmlns:a16="http://schemas.microsoft.com/office/drawing/2014/main" id="{0D04810E-4C63-7741-BA24-3F72DF9AF6AA}"/>
-              </a:ext>
-            </a:extLst>
-          </p:cNvPr>
-          <p:cNvCxnSpPr>
-            <a:cxnSpLocks/>
-          </p:cNvCxnSpPr>
-          <p:nvPr/>
-        </p:nvCxnSpPr>
-        <p:spPr>
-          <a:xfrm>
-            <a:off x="7310035" y="5022369"/>
-            <a:ext cx="432786" cy="0"/>
-          </a:xfrm>
-          <a:prstGeom prst="straightConnector1">
-            <a:avLst/>
-          </a:prstGeom>
-          <a:ln w="12700">
-            <a:solidFill>
-              <a:srgbClr val="545B64"/>
-            </a:solidFill>
-            <a:headEnd type="none" w="med" len="sm"/>
-            <a:tailEnd type="arrow" w="med" len="sm"/>
-          </a:ln>
-        </p:spPr>
-        <p:style>
-          <a:lnRef idx="1">
-            <a:schemeClr val="accent1"/>
-          </a:lnRef>
-          <a:fillRef idx="0">
-            <a:schemeClr val="accent1"/>
-          </a:fillRef>
-          <a:effectRef idx="0">
-            <a:schemeClr val="accent1"/>
-          </a:effectRef>
-          <a:fontRef idx="minor">
-            <a:schemeClr val="tx1"/>
-          </a:fontRef>
-        </p:style>
-      </p:cxnSp>
+            <a:r>
+              <a:rPr lang="en-US" sz="1100" b="1" dirty="0">
+                <a:solidFill>
+                  <a:schemeClr val="tx1"/>
+                </a:solidFill>
+                <a:latin typeface="Arial" panose="020B0604020202020204" pitchFamily="34" charset="0"/>
+                <a:cs typeface="Arial" panose="020B0604020202020204" pitchFamily="34" charset="0"/>
+              </a:rPr>
+              <a:t>Home-region</a:t>
+            </a:r>
+          </a:p>
+        </p:txBody>
+      </p:sp>
       <p:sp>
         <p:nvSpPr>
           <p:cNvPr id="66" name="Oval 65">
@@ -5452,7 +5028,7 @@
         </p:nvSpPr>
         <p:spPr>
           <a:xfrm>
-            <a:off x="3215867" y="622555"/>
+            <a:off x="3921080" y="895909"/>
             <a:ext cx="253435" cy="212902"/>
           </a:xfrm>
           <a:prstGeom prst="ellipse">
@@ -5512,7 +5088,7 @@
         </p:nvSpPr>
         <p:spPr>
           <a:xfrm>
-            <a:off x="3590436" y="1722801"/>
+            <a:off x="4578159" y="2547955"/>
             <a:ext cx="253435" cy="212902"/>
           </a:xfrm>
           <a:prstGeom prst="ellipse">
@@ -5572,7 +5148,7 @@
         </p:nvSpPr>
         <p:spPr>
           <a:xfrm>
-            <a:off x="5338455" y="1252488"/>
+            <a:off x="5667689" y="2036695"/>
             <a:ext cx="253435" cy="212902"/>
           </a:xfrm>
           <a:prstGeom prst="ellipse">
@@ -5632,7 +5208,7 @@
         </p:nvSpPr>
         <p:spPr>
           <a:xfrm>
-            <a:off x="6345113" y="1739970"/>
+            <a:off x="5589212" y="1311487"/>
             <a:ext cx="253435" cy="212902"/>
           </a:xfrm>
           <a:prstGeom prst="ellipse">
@@ -5692,7 +5268,7 @@
         </p:nvSpPr>
         <p:spPr>
           <a:xfrm>
-            <a:off x="5355555" y="2507578"/>
+            <a:off x="5525441" y="3176190"/>
             <a:ext cx="253435" cy="212902"/>
           </a:xfrm>
           <a:prstGeom prst="ellipse">
@@ -5752,7 +5328,7 @@
         </p:nvSpPr>
         <p:spPr>
           <a:xfrm>
-            <a:off x="7341270" y="1246856"/>
+            <a:off x="7880017" y="2165911"/>
             <a:ext cx="253435" cy="212902"/>
           </a:xfrm>
           <a:prstGeom prst="ellipse">
@@ -5812,8 +5388,8 @@
         </p:nvSpPr>
         <p:spPr>
           <a:xfrm>
-            <a:off x="8334740" y="1722801"/>
-            <a:ext cx="253435" cy="212902"/>
+            <a:off x="7658999" y="1313676"/>
+            <a:ext cx="280121" cy="212902"/>
           </a:xfrm>
           <a:prstGeom prst="ellipse">
             <a:avLst/>
@@ -5872,7 +5448,7 @@
         </p:nvSpPr>
         <p:spPr>
           <a:xfrm>
-            <a:off x="7347923" y="2507578"/>
+            <a:off x="7628372" y="3169229"/>
             <a:ext cx="253435" cy="212902"/>
           </a:xfrm>
           <a:prstGeom prst="ellipse">
@@ -5932,7 +5508,7 @@
         </p:nvSpPr>
         <p:spPr>
           <a:xfrm>
-            <a:off x="2589878" y="3738071"/>
+            <a:off x="3031690" y="4234256"/>
             <a:ext cx="253435" cy="212902"/>
           </a:xfrm>
           <a:prstGeom prst="ellipse">
@@ -5992,7 +5568,7 @@
         </p:nvSpPr>
         <p:spPr>
           <a:xfrm>
-            <a:off x="2962432" y="4692868"/>
+            <a:off x="3476354" y="4989700"/>
             <a:ext cx="253435" cy="212902"/>
           </a:xfrm>
           <a:prstGeom prst="ellipse">
@@ -6052,7 +5628,7 @@
         </p:nvSpPr>
         <p:spPr>
           <a:xfrm>
-            <a:off x="4765847" y="4685416"/>
+            <a:off x="4494828" y="4991284"/>
             <a:ext cx="253435" cy="212902"/>
           </a:xfrm>
           <a:prstGeom prst="ellipse">
@@ -6112,7 +5688,7 @@
         </p:nvSpPr>
         <p:spPr>
           <a:xfrm>
-            <a:off x="6347087" y="3742341"/>
+            <a:off x="6391276" y="4229980"/>
             <a:ext cx="253435" cy="212902"/>
           </a:xfrm>
           <a:prstGeom prst="ellipse">
@@ -6172,7 +5748,7 @@
         </p:nvSpPr>
         <p:spPr>
           <a:xfrm>
-            <a:off x="6697996" y="4756891"/>
+            <a:off x="6839173" y="4985021"/>
             <a:ext cx="253435" cy="212902"/>
           </a:xfrm>
           <a:prstGeom prst="ellipse">
@@ -6218,12 +5794,553 @@
           </a:p>
         </p:txBody>
       </p:sp>
-      <p:sp>
-        <p:nvSpPr>
-          <p:cNvPr id="80" name="Oval 79">
-            <a:extLst>
-              <a:ext uri="{FF2B5EF4-FFF2-40B4-BE49-F238E27FC236}">
-                <a16:creationId xmlns:a16="http://schemas.microsoft.com/office/drawing/2014/main" id="{48C4D317-93F4-5641-8DFB-C87230F448BF}"/>
+      <p:pic>
+        <p:nvPicPr>
+          <p:cNvPr id="58" name="Graphic 7">
+            <a:extLst>
+              <a:ext uri="{FF2B5EF4-FFF2-40B4-BE49-F238E27FC236}">
+                <a16:creationId xmlns:a16="http://schemas.microsoft.com/office/drawing/2014/main" id="{75B27E1D-9B39-A446-B395-F538671C9EED}"/>
+              </a:ext>
+            </a:extLst>
+          </p:cNvPr>
+          <p:cNvPicPr>
+            <a:picLocks noChangeAspect="1" noChangeArrowheads="1"/>
+          </p:cNvPicPr>
+          <p:nvPr/>
+        </p:nvPicPr>
+        <p:blipFill>
+          <a:blip r:embed="rId12">
+            <a:extLst>
+              <a:ext uri="{28A0092B-C50C-407E-A947-70E740481C1C}">
+                <a14:useLocalDpi xmlns:a14="http://schemas.microsoft.com/office/drawing/2010/main" val="0"/>
+              </a:ext>
+            </a:extLst>
+          </a:blip>
+          <a:srcRect/>
+          <a:stretch>
+            <a:fillRect/>
+          </a:stretch>
+        </p:blipFill>
+        <p:spPr bwMode="auto">
+          <a:xfrm>
+            <a:off x="5817551" y="3128913"/>
+            <a:ext cx="457200" cy="457200"/>
+          </a:xfrm>
+          <a:prstGeom prst="rect">
+            <a:avLst/>
+          </a:prstGeom>
+          <a:noFill/>
+          <a:ln>
+            <a:noFill/>
+          </a:ln>
+          <a:extLst>
+            <a:ext uri="{909E8E84-426E-40DD-AFC4-6F175D3DCCD1}">
+              <a14:hiddenFill xmlns:a14="http://schemas.microsoft.com/office/drawing/2010/main">
+                <a:solidFill>
+                  <a:srgbClr val="FFFFFF"/>
+                </a:solidFill>
+              </a14:hiddenFill>
+            </a:ext>
+            <a:ext uri="{91240B29-F687-4F45-9708-019B960494DF}">
+              <a14:hiddenLine xmlns:a14="http://schemas.microsoft.com/office/drawing/2010/main" w="9525">
+                <a:solidFill>
+                  <a:srgbClr val="000000"/>
+                </a:solidFill>
+                <a:miter lim="800000"/>
+                <a:headEnd/>
+                <a:tailEnd/>
+              </a14:hiddenLine>
+            </a:ext>
+          </a:extLst>
+        </p:spPr>
+      </p:pic>
+      <p:pic>
+        <p:nvPicPr>
+          <p:cNvPr id="59" name="Graphic 7">
+            <a:extLst>
+              <a:ext uri="{FF2B5EF4-FFF2-40B4-BE49-F238E27FC236}">
+                <a16:creationId xmlns:a16="http://schemas.microsoft.com/office/drawing/2014/main" id="{A051C423-BC6B-AC42-AC0F-47D5DBB29B3A}"/>
+              </a:ext>
+            </a:extLst>
+          </p:cNvPr>
+          <p:cNvPicPr>
+            <a:picLocks noChangeAspect="1" noChangeArrowheads="1"/>
+          </p:cNvPicPr>
+          <p:nvPr/>
+        </p:nvPicPr>
+        <p:blipFill>
+          <a:blip r:embed="rId12">
+            <a:extLst>
+              <a:ext uri="{28A0092B-C50C-407E-A947-70E740481C1C}">
+                <a14:useLocalDpi xmlns:a14="http://schemas.microsoft.com/office/drawing/2010/main" val="0"/>
+              </a:ext>
+            </a:extLst>
+          </a:blip>
+          <a:srcRect/>
+          <a:stretch>
+            <a:fillRect/>
+          </a:stretch>
+        </p:blipFill>
+        <p:spPr bwMode="auto">
+          <a:xfrm>
+            <a:off x="7891763" y="3102602"/>
+            <a:ext cx="457200" cy="457200"/>
+          </a:xfrm>
+          <a:prstGeom prst="rect">
+            <a:avLst/>
+          </a:prstGeom>
+          <a:noFill/>
+          <a:ln>
+            <a:noFill/>
+          </a:ln>
+          <a:extLst>
+            <a:ext uri="{909E8E84-426E-40DD-AFC4-6F175D3DCCD1}">
+              <a14:hiddenFill xmlns:a14="http://schemas.microsoft.com/office/drawing/2010/main">
+                <a:solidFill>
+                  <a:srgbClr val="FFFFFF"/>
+                </a:solidFill>
+              </a14:hiddenFill>
+            </a:ext>
+            <a:ext uri="{91240B29-F687-4F45-9708-019B960494DF}">
+              <a14:hiddenLine xmlns:a14="http://schemas.microsoft.com/office/drawing/2010/main" w="9525">
+                <a:solidFill>
+                  <a:srgbClr val="000000"/>
+                </a:solidFill>
+                <a:miter lim="800000"/>
+                <a:headEnd/>
+                <a:tailEnd/>
+              </a14:hiddenLine>
+            </a:ext>
+          </a:extLst>
+        </p:spPr>
+      </p:pic>
+      <p:cxnSp>
+        <p:nvCxnSpPr>
+          <p:cNvPr id="60" name="Straight Arrow Connector 59">
+            <a:extLst>
+              <a:ext uri="{FF2B5EF4-FFF2-40B4-BE49-F238E27FC236}">
+                <a16:creationId xmlns:a16="http://schemas.microsoft.com/office/drawing/2014/main" id="{2BF46915-BB1A-5D4C-B857-7122DF100EFC}"/>
+              </a:ext>
+            </a:extLst>
+          </p:cNvPr>
+          <p:cNvCxnSpPr>
+            <a:cxnSpLocks/>
+            <a:stCxn id="11" idx="2"/>
+            <a:endCxn id="59" idx="0"/>
+          </p:cNvCxnSpPr>
+          <p:nvPr/>
+        </p:nvCxnSpPr>
+        <p:spPr>
+          <a:xfrm>
+            <a:off x="8120363" y="2865256"/>
+            <a:ext cx="0" cy="237346"/>
+          </a:xfrm>
+          <a:prstGeom prst="straightConnector1">
+            <a:avLst/>
+          </a:prstGeom>
+          <a:ln>
+            <a:tailEnd type="triangle"/>
+          </a:ln>
+        </p:spPr>
+        <p:style>
+          <a:lnRef idx="1">
+            <a:schemeClr val="dk1"/>
+          </a:lnRef>
+          <a:fillRef idx="0">
+            <a:schemeClr val="dk1"/>
+          </a:fillRef>
+          <a:effectRef idx="0">
+            <a:schemeClr val="dk1"/>
+          </a:effectRef>
+          <a:fontRef idx="minor">
+            <a:schemeClr val="tx1"/>
+          </a:fontRef>
+        </p:style>
+      </p:cxnSp>
+      <p:cxnSp>
+        <p:nvCxnSpPr>
+          <p:cNvPr id="63" name="Straight Arrow Connector 62">
+            <a:extLst>
+              <a:ext uri="{FF2B5EF4-FFF2-40B4-BE49-F238E27FC236}">
+                <a16:creationId xmlns:a16="http://schemas.microsoft.com/office/drawing/2014/main" id="{242371DE-6996-FF4B-A389-02106BCD96F2}"/>
+              </a:ext>
+            </a:extLst>
+          </p:cNvPr>
+          <p:cNvCxnSpPr>
+            <a:cxnSpLocks/>
+            <a:endCxn id="58" idx="0"/>
+          </p:cNvCxnSpPr>
+          <p:nvPr/>
+        </p:nvCxnSpPr>
+        <p:spPr>
+          <a:xfrm>
+            <a:off x="6045752" y="2809346"/>
+            <a:ext cx="399" cy="319567"/>
+          </a:xfrm>
+          <a:prstGeom prst="straightConnector1">
+            <a:avLst/>
+          </a:prstGeom>
+          <a:ln>
+            <a:tailEnd type="triangle"/>
+          </a:ln>
+        </p:spPr>
+        <p:style>
+          <a:lnRef idx="1">
+            <a:schemeClr val="dk1"/>
+          </a:lnRef>
+          <a:fillRef idx="0">
+            <a:schemeClr val="dk1"/>
+          </a:fillRef>
+          <a:effectRef idx="0">
+            <a:schemeClr val="dk1"/>
+          </a:effectRef>
+          <a:fontRef idx="minor">
+            <a:schemeClr val="tx1"/>
+          </a:fontRef>
+        </p:style>
+      </p:cxnSp>
+      <p:pic>
+        <p:nvPicPr>
+          <p:cNvPr id="81" name="Graphic 13">
+            <a:extLst>
+              <a:ext uri="{FF2B5EF4-FFF2-40B4-BE49-F238E27FC236}">
+                <a16:creationId xmlns:a16="http://schemas.microsoft.com/office/drawing/2014/main" id="{A9FAE202-A507-B84E-8053-91075A662342}"/>
+              </a:ext>
+            </a:extLst>
+          </p:cNvPr>
+          <p:cNvPicPr>
+            <a:picLocks noChangeAspect="1" noChangeArrowheads="1"/>
+          </p:cNvPicPr>
+          <p:nvPr/>
+        </p:nvPicPr>
+        <p:blipFill>
+          <a:blip r:embed="rId13">
+            <a:extLst>
+              <a:ext uri="{28A0092B-C50C-407E-A947-70E740481C1C}">
+                <a14:useLocalDpi xmlns:a14="http://schemas.microsoft.com/office/drawing/2010/main" val="0"/>
+              </a:ext>
+            </a:extLst>
+          </a:blip>
+          <a:srcRect/>
+          <a:stretch>
+            <a:fillRect/>
+          </a:stretch>
+        </p:blipFill>
+        <p:spPr bwMode="auto">
+          <a:xfrm>
+            <a:off x="5817551" y="2139297"/>
+            <a:ext cx="457200" cy="457200"/>
+          </a:xfrm>
+          <a:prstGeom prst="rect">
+            <a:avLst/>
+          </a:prstGeom>
+          <a:noFill/>
+          <a:ln>
+            <a:noFill/>
+          </a:ln>
+          <a:extLst>
+            <a:ext uri="{909E8E84-426E-40DD-AFC4-6F175D3DCCD1}">
+              <a14:hiddenFill xmlns:a14="http://schemas.microsoft.com/office/drawing/2010/main">
+                <a:solidFill>
+                  <a:srgbClr val="FFFFFF"/>
+                </a:solidFill>
+              </a14:hiddenFill>
+            </a:ext>
+            <a:ext uri="{91240B29-F687-4F45-9708-019B960494DF}">
+              <a14:hiddenLine xmlns:a14="http://schemas.microsoft.com/office/drawing/2010/main" w="9525">
+                <a:solidFill>
+                  <a:srgbClr val="000000"/>
+                </a:solidFill>
+                <a:miter lim="800000"/>
+                <a:headEnd/>
+                <a:tailEnd/>
+              </a14:hiddenLine>
+            </a:ext>
+          </a:extLst>
+        </p:spPr>
+      </p:pic>
+      <p:pic>
+        <p:nvPicPr>
+          <p:cNvPr id="82" name="Graphic 14">
+            <a:extLst>
+              <a:ext uri="{FF2B5EF4-FFF2-40B4-BE49-F238E27FC236}">
+                <a16:creationId xmlns:a16="http://schemas.microsoft.com/office/drawing/2014/main" id="{CA2BC85C-8293-1942-8BFF-1B04C8980414}"/>
+              </a:ext>
+            </a:extLst>
+          </p:cNvPr>
+          <p:cNvPicPr>
+            <a:picLocks noChangeAspect="1" noChangeArrowheads="1"/>
+          </p:cNvPicPr>
+          <p:nvPr/>
+        </p:nvPicPr>
+        <p:blipFill>
+          <a:blip r:embed="rId14">
+            <a:extLst>
+              <a:ext uri="{28A0092B-C50C-407E-A947-70E740481C1C}">
+                <a14:useLocalDpi xmlns:a14="http://schemas.microsoft.com/office/drawing/2010/main" val="0"/>
+              </a:ext>
+            </a:extLst>
+          </a:blip>
+          <a:srcRect/>
+          <a:stretch>
+            <a:fillRect/>
+          </a:stretch>
+        </p:blipFill>
+        <p:spPr bwMode="auto">
+          <a:xfrm>
+            <a:off x="7858940" y="4991284"/>
+            <a:ext cx="457200" cy="457200"/>
+          </a:xfrm>
+          <a:prstGeom prst="rect">
+            <a:avLst/>
+          </a:prstGeom>
+          <a:noFill/>
+          <a:ln>
+            <a:noFill/>
+          </a:ln>
+          <a:extLst>
+            <a:ext uri="{909E8E84-426E-40DD-AFC4-6F175D3DCCD1}">
+              <a14:hiddenFill xmlns:a14="http://schemas.microsoft.com/office/drawing/2010/main">
+                <a:solidFill>
+                  <a:srgbClr val="FFFFFF"/>
+                </a:solidFill>
+              </a14:hiddenFill>
+            </a:ext>
+            <a:ext uri="{91240B29-F687-4F45-9708-019B960494DF}">
+              <a14:hiddenLine xmlns:a14="http://schemas.microsoft.com/office/drawing/2010/main" w="9525">
+                <a:solidFill>
+                  <a:srgbClr val="000000"/>
+                </a:solidFill>
+                <a:miter lim="800000"/>
+                <a:headEnd/>
+                <a:tailEnd/>
+              </a14:hiddenLine>
+            </a:ext>
+          </a:extLst>
+        </p:spPr>
+      </p:pic>
+      <p:cxnSp>
+        <p:nvCxnSpPr>
+          <p:cNvPr id="87" name="Straight Arrow Connector 86">
+            <a:extLst>
+              <a:ext uri="{FF2B5EF4-FFF2-40B4-BE49-F238E27FC236}">
+                <a16:creationId xmlns:a16="http://schemas.microsoft.com/office/drawing/2014/main" id="{A29B98B9-DB13-4647-9697-6D869BF46A54}"/>
+              </a:ext>
+            </a:extLst>
+          </p:cNvPr>
+          <p:cNvCxnSpPr>
+            <a:cxnSpLocks/>
+          </p:cNvCxnSpPr>
+          <p:nvPr/>
+        </p:nvCxnSpPr>
+        <p:spPr>
+          <a:xfrm>
+            <a:off x="6605713" y="2366400"/>
+            <a:ext cx="869156" cy="1497"/>
+          </a:xfrm>
+          <a:prstGeom prst="straightConnector1">
+            <a:avLst/>
+          </a:prstGeom>
+          <a:ln>
+            <a:tailEnd type="triangle"/>
+          </a:ln>
+        </p:spPr>
+        <p:style>
+          <a:lnRef idx="1">
+            <a:schemeClr val="dk1"/>
+          </a:lnRef>
+          <a:fillRef idx="0">
+            <a:schemeClr val="dk1"/>
+          </a:fillRef>
+          <a:effectRef idx="0">
+            <a:schemeClr val="dk1"/>
+          </a:effectRef>
+          <a:fontRef idx="minor">
+            <a:schemeClr val="tx1"/>
+          </a:fontRef>
+        </p:style>
+      </p:cxnSp>
+      <p:pic>
+        <p:nvPicPr>
+          <p:cNvPr id="88" name="Graphic 17">
+            <a:extLst>
+              <a:ext uri="{FF2B5EF4-FFF2-40B4-BE49-F238E27FC236}">
+                <a16:creationId xmlns:a16="http://schemas.microsoft.com/office/drawing/2014/main" id="{DB6F5160-3FD1-AC4B-829B-C202446DF78D}"/>
+              </a:ext>
+            </a:extLst>
+          </p:cNvPr>
+          <p:cNvPicPr>
+            <a:picLocks noChangeAspect="1" noChangeArrowheads="1"/>
+          </p:cNvPicPr>
+          <p:nvPr/>
+        </p:nvPicPr>
+        <p:blipFill>
+          <a:blip r:embed="rId15">
+            <a:extLst>
+              <a:ext uri="{28A0092B-C50C-407E-A947-70E740481C1C}">
+                <a14:useLocalDpi xmlns:a14="http://schemas.microsoft.com/office/drawing/2010/main" val="0"/>
+              </a:ext>
+            </a:extLst>
+          </a:blip>
+          <a:srcRect/>
+          <a:stretch>
+            <a:fillRect/>
+          </a:stretch>
+        </p:blipFill>
+        <p:spPr bwMode="auto">
+          <a:xfrm>
+            <a:off x="5510271" y="4975116"/>
+            <a:ext cx="457200" cy="457200"/>
+          </a:xfrm>
+          <a:prstGeom prst="rect">
+            <a:avLst/>
+          </a:prstGeom>
+          <a:noFill/>
+          <a:ln>
+            <a:noFill/>
+          </a:ln>
+          <a:extLst>
+            <a:ext uri="{909E8E84-426E-40DD-AFC4-6F175D3DCCD1}">
+              <a14:hiddenFill xmlns:a14="http://schemas.microsoft.com/office/drawing/2010/main">
+                <a:solidFill>
+                  <a:srgbClr val="FFFFFF"/>
+                </a:solidFill>
+              </a14:hiddenFill>
+            </a:ext>
+            <a:ext uri="{91240B29-F687-4F45-9708-019B960494DF}">
+              <a14:hiddenLine xmlns:a14="http://schemas.microsoft.com/office/drawing/2010/main" w="9525">
+                <a:solidFill>
+                  <a:srgbClr val="000000"/>
+                </a:solidFill>
+                <a:miter lim="800000"/>
+                <a:headEnd/>
+                <a:tailEnd/>
+              </a14:hiddenLine>
+            </a:ext>
+          </a:extLst>
+        </p:spPr>
+      </p:pic>
+      <p:sp>
+        <p:nvSpPr>
+          <p:cNvPr id="91" name="TextBox 2">
+            <a:extLst>
+              <a:ext uri="{FF2B5EF4-FFF2-40B4-BE49-F238E27FC236}">
+                <a16:creationId xmlns:a16="http://schemas.microsoft.com/office/drawing/2014/main" id="{1C50B2B9-4453-9149-8B0F-1125095B25A0}"/>
+              </a:ext>
+            </a:extLst>
+          </p:cNvPr>
+          <p:cNvSpPr txBox="1"/>
+          <p:nvPr/>
+        </p:nvSpPr>
+        <p:spPr>
+          <a:xfrm>
+            <a:off x="5328852" y="5431822"/>
+            <a:ext cx="810161" cy="430887"/>
+          </a:xfrm>
+          <a:prstGeom prst="rect">
+            <a:avLst/>
+          </a:prstGeom>
+          <a:noFill/>
+        </p:spPr>
+        <p:style>
+          <a:lnRef idx="0">
+            <a:scrgbClr r="0" g="0" b="0"/>
+          </a:lnRef>
+          <a:fillRef idx="0">
+            <a:scrgbClr r="0" g="0" b="0"/>
+          </a:fillRef>
+          <a:effectRef idx="0">
+            <a:scrgbClr r="0" g="0" b="0"/>
+          </a:effectRef>
+          <a:fontRef idx="major"/>
+        </p:style>
+        <p:txBody>
+          <a:bodyPr wrap="square" rtlCol="0">
+            <a:spAutoFit/>
+          </a:bodyPr>
+          <a:lstStyle>
+            <a:lvl1pPr>
+              <a:defRPr>
+                <a:latin typeface="+mj-lt"/>
+                <a:ea typeface="+mj-ea"/>
+                <a:cs typeface="+mj-cs"/>
+              </a:defRPr>
+            </a:lvl1pPr>
+            <a:lvl2pPr>
+              <a:defRPr>
+                <a:latin typeface="+mj-lt"/>
+                <a:ea typeface="+mj-ea"/>
+                <a:cs typeface="+mj-cs"/>
+              </a:defRPr>
+            </a:lvl2pPr>
+            <a:lvl3pPr>
+              <a:defRPr>
+                <a:latin typeface="+mj-lt"/>
+                <a:ea typeface="+mj-ea"/>
+                <a:cs typeface="+mj-cs"/>
+              </a:defRPr>
+            </a:lvl3pPr>
+            <a:lvl4pPr>
+              <a:defRPr>
+                <a:latin typeface="+mj-lt"/>
+                <a:ea typeface="+mj-ea"/>
+                <a:cs typeface="+mj-cs"/>
+              </a:defRPr>
+            </a:lvl4pPr>
+            <a:lvl5pPr>
+              <a:defRPr>
+                <a:latin typeface="+mj-lt"/>
+                <a:ea typeface="+mj-ea"/>
+                <a:cs typeface="+mj-cs"/>
+              </a:defRPr>
+            </a:lvl5pPr>
+            <a:lvl6pPr>
+              <a:defRPr>
+                <a:latin typeface="+mj-lt"/>
+                <a:ea typeface="+mj-ea"/>
+                <a:cs typeface="+mj-cs"/>
+              </a:defRPr>
+            </a:lvl6pPr>
+            <a:lvl7pPr>
+              <a:defRPr>
+                <a:latin typeface="+mj-lt"/>
+                <a:ea typeface="+mj-ea"/>
+                <a:cs typeface="+mj-cs"/>
+              </a:defRPr>
+            </a:lvl7pPr>
+            <a:lvl8pPr>
+              <a:defRPr>
+                <a:latin typeface="+mj-lt"/>
+                <a:ea typeface="+mj-ea"/>
+                <a:cs typeface="+mj-cs"/>
+              </a:defRPr>
+            </a:lvl8pPr>
+            <a:lvl9pPr>
+              <a:defRPr>
+                <a:latin typeface="+mj-lt"/>
+                <a:ea typeface="+mj-ea"/>
+                <a:cs typeface="+mj-cs"/>
+              </a:defRPr>
+            </a:lvl9pPr>
+          </a:lstStyle>
+          <a:p>
+            <a:pPr algn="ctr"/>
+            <a:r>
+              <a:rPr lang="en-US" sz="1100" dirty="0">
+                <a:latin typeface="Arial" panose="020B0604020202020204" pitchFamily="34" charset="0"/>
+                <a:cs typeface="Arial" panose="020B0604020202020204" pitchFamily="34" charset="0"/>
+              </a:rPr>
+              <a:t>KMS Key Secret</a:t>
+            </a:r>
+          </a:p>
+        </p:txBody>
+      </p:sp>
+      <p:sp>
+        <p:nvSpPr>
+          <p:cNvPr id="93" name="Oval 92">
+            <a:extLst>
+              <a:ext uri="{FF2B5EF4-FFF2-40B4-BE49-F238E27FC236}">
+                <a16:creationId xmlns:a16="http://schemas.microsoft.com/office/drawing/2014/main" id="{ADFF5F4F-F555-C54B-BB12-CDF587B77932}"/>
               </a:ext>
             </a:extLst>
           </p:cNvPr>
@@ -6232,7 +6349,302 @@
         </p:nvSpPr>
         <p:spPr>
           <a:xfrm>
-            <a:off x="8503928" y="4719229"/>
+            <a:off x="5525440" y="4980749"/>
+            <a:ext cx="253435" cy="212902"/>
+          </a:xfrm>
+          <a:prstGeom prst="ellipse">
+            <a:avLst/>
+          </a:prstGeom>
+          <a:solidFill>
+            <a:schemeClr val="tx1"/>
+          </a:solidFill>
+          <a:ln>
+            <a:solidFill>
+              <a:schemeClr val="tx1"/>
+            </a:solidFill>
+          </a:ln>
+        </p:spPr>
+        <p:style>
+          <a:lnRef idx="2">
+            <a:schemeClr val="accent1">
+              <a:shade val="50000"/>
+            </a:schemeClr>
+          </a:lnRef>
+          <a:fillRef idx="1">
+            <a:schemeClr val="accent1"/>
+          </a:fillRef>
+          <a:effectRef idx="0">
+            <a:schemeClr val="accent1"/>
+          </a:effectRef>
+          <a:fontRef idx="minor">
+            <a:schemeClr val="lt1"/>
+          </a:fontRef>
+        </p:style>
+        <p:txBody>
+          <a:bodyPr lIns="0" tIns="0" rIns="0" bIns="0" rtlCol="0" anchor="ctr"/>
+          <a:lstStyle/>
+          <a:p>
+            <a:pPr algn="ctr"/>
+            <a:r>
+              <a:rPr lang="en-US" sz="800" dirty="0">
+                <a:latin typeface="Arial" panose="020B0604020202020204" pitchFamily="34" charset="0"/>
+                <a:cs typeface="Arial" panose="020B0604020202020204" pitchFamily="34" charset="0"/>
+              </a:rPr>
+              <a:t>2.3</a:t>
+            </a:r>
+          </a:p>
+        </p:txBody>
+      </p:sp>
+      <p:pic>
+        <p:nvPicPr>
+          <p:cNvPr id="94" name="Graphic 17">
+            <a:extLst>
+              <a:ext uri="{FF2B5EF4-FFF2-40B4-BE49-F238E27FC236}">
+                <a16:creationId xmlns:a16="http://schemas.microsoft.com/office/drawing/2014/main" id="{500C4714-29C8-C54F-AC1F-1031983778B6}"/>
+              </a:ext>
+            </a:extLst>
+          </p:cNvPr>
+          <p:cNvPicPr>
+            <a:picLocks noChangeAspect="1" noChangeArrowheads="1"/>
+          </p:cNvPicPr>
+          <p:nvPr/>
+        </p:nvPicPr>
+        <p:blipFill>
+          <a:blip r:embed="rId15">
+            <a:extLst>
+              <a:ext uri="{28A0092B-C50C-407E-A947-70E740481C1C}">
+                <a14:useLocalDpi xmlns:a14="http://schemas.microsoft.com/office/drawing/2010/main" val="0"/>
+              </a:ext>
+            </a:extLst>
+          </a:blip>
+          <a:srcRect/>
+          <a:stretch>
+            <a:fillRect/>
+          </a:stretch>
+        </p:blipFill>
+        <p:spPr bwMode="auto">
+          <a:xfrm>
+            <a:off x="8832085" y="4967394"/>
+            <a:ext cx="457200" cy="457200"/>
+          </a:xfrm>
+          <a:prstGeom prst="rect">
+            <a:avLst/>
+          </a:prstGeom>
+          <a:noFill/>
+          <a:ln>
+            <a:noFill/>
+          </a:ln>
+          <a:extLst>
+            <a:ext uri="{909E8E84-426E-40DD-AFC4-6F175D3DCCD1}">
+              <a14:hiddenFill xmlns:a14="http://schemas.microsoft.com/office/drawing/2010/main">
+                <a:solidFill>
+                  <a:srgbClr val="FFFFFF"/>
+                </a:solidFill>
+              </a14:hiddenFill>
+            </a:ext>
+            <a:ext uri="{91240B29-F687-4F45-9708-019B960494DF}">
+              <a14:hiddenLine xmlns:a14="http://schemas.microsoft.com/office/drawing/2010/main" w="9525">
+                <a:solidFill>
+                  <a:srgbClr val="000000"/>
+                </a:solidFill>
+                <a:miter lim="800000"/>
+                <a:headEnd/>
+                <a:tailEnd/>
+              </a14:hiddenLine>
+            </a:ext>
+          </a:extLst>
+        </p:spPr>
+      </p:pic>
+      <p:sp>
+        <p:nvSpPr>
+          <p:cNvPr id="95" name="TextBox 2">
+            <a:extLst>
+              <a:ext uri="{FF2B5EF4-FFF2-40B4-BE49-F238E27FC236}">
+                <a16:creationId xmlns:a16="http://schemas.microsoft.com/office/drawing/2014/main" id="{F475554E-0F05-5242-A6C2-546AC18581C7}"/>
+              </a:ext>
+            </a:extLst>
+          </p:cNvPr>
+          <p:cNvSpPr txBox="1"/>
+          <p:nvPr/>
+        </p:nvSpPr>
+        <p:spPr>
+          <a:xfrm>
+            <a:off x="8646981" y="5424594"/>
+            <a:ext cx="827407" cy="430887"/>
+          </a:xfrm>
+          <a:prstGeom prst="rect">
+            <a:avLst/>
+          </a:prstGeom>
+          <a:noFill/>
+        </p:spPr>
+        <p:style>
+          <a:lnRef idx="0">
+            <a:scrgbClr r="0" g="0" b="0"/>
+          </a:lnRef>
+          <a:fillRef idx="0">
+            <a:scrgbClr r="0" g="0" b="0"/>
+          </a:fillRef>
+          <a:effectRef idx="0">
+            <a:scrgbClr r="0" g="0" b="0"/>
+          </a:effectRef>
+          <a:fontRef idx="major"/>
+        </p:style>
+        <p:txBody>
+          <a:bodyPr wrap="square" rtlCol="0">
+            <a:spAutoFit/>
+          </a:bodyPr>
+          <a:lstStyle>
+            <a:lvl1pPr>
+              <a:defRPr>
+                <a:latin typeface="+mj-lt"/>
+                <a:ea typeface="+mj-ea"/>
+                <a:cs typeface="+mj-cs"/>
+              </a:defRPr>
+            </a:lvl1pPr>
+            <a:lvl2pPr>
+              <a:defRPr>
+                <a:latin typeface="+mj-lt"/>
+                <a:ea typeface="+mj-ea"/>
+                <a:cs typeface="+mj-cs"/>
+              </a:defRPr>
+            </a:lvl2pPr>
+            <a:lvl3pPr>
+              <a:defRPr>
+                <a:latin typeface="+mj-lt"/>
+                <a:ea typeface="+mj-ea"/>
+                <a:cs typeface="+mj-cs"/>
+              </a:defRPr>
+            </a:lvl3pPr>
+            <a:lvl4pPr>
+              <a:defRPr>
+                <a:latin typeface="+mj-lt"/>
+                <a:ea typeface="+mj-ea"/>
+                <a:cs typeface="+mj-cs"/>
+              </a:defRPr>
+            </a:lvl4pPr>
+            <a:lvl5pPr>
+              <a:defRPr>
+                <a:latin typeface="+mj-lt"/>
+                <a:ea typeface="+mj-ea"/>
+                <a:cs typeface="+mj-cs"/>
+              </a:defRPr>
+            </a:lvl5pPr>
+            <a:lvl6pPr>
+              <a:defRPr>
+                <a:latin typeface="+mj-lt"/>
+                <a:ea typeface="+mj-ea"/>
+                <a:cs typeface="+mj-cs"/>
+              </a:defRPr>
+            </a:lvl6pPr>
+            <a:lvl7pPr>
+              <a:defRPr>
+                <a:latin typeface="+mj-lt"/>
+                <a:ea typeface="+mj-ea"/>
+                <a:cs typeface="+mj-cs"/>
+              </a:defRPr>
+            </a:lvl7pPr>
+            <a:lvl8pPr>
+              <a:defRPr>
+                <a:latin typeface="+mj-lt"/>
+                <a:ea typeface="+mj-ea"/>
+                <a:cs typeface="+mj-cs"/>
+              </a:defRPr>
+            </a:lvl8pPr>
+            <a:lvl9pPr>
+              <a:defRPr>
+                <a:latin typeface="+mj-lt"/>
+                <a:ea typeface="+mj-ea"/>
+                <a:cs typeface="+mj-cs"/>
+              </a:defRPr>
+            </a:lvl9pPr>
+          </a:lstStyle>
+          <a:p>
+            <a:pPr algn="ctr"/>
+            <a:r>
+              <a:rPr lang="en-US" sz="1100" dirty="0">
+                <a:latin typeface="Arial" panose="020B0604020202020204" pitchFamily="34" charset="0"/>
+                <a:cs typeface="Arial" panose="020B0604020202020204" pitchFamily="34" charset="0"/>
+              </a:rPr>
+              <a:t>S3 Bucket Secret</a:t>
+            </a:r>
+          </a:p>
+        </p:txBody>
+      </p:sp>
+      <p:sp>
+        <p:nvSpPr>
+          <p:cNvPr id="96" name="Oval 95">
+            <a:extLst>
+              <a:ext uri="{FF2B5EF4-FFF2-40B4-BE49-F238E27FC236}">
+                <a16:creationId xmlns:a16="http://schemas.microsoft.com/office/drawing/2014/main" id="{30425177-2E70-3246-9985-D5F142053EB0}"/>
+              </a:ext>
+            </a:extLst>
+          </p:cNvPr>
+          <p:cNvSpPr/>
+          <p:nvPr/>
+        </p:nvSpPr>
+        <p:spPr>
+          <a:xfrm>
+            <a:off x="8846755" y="4983562"/>
+            <a:ext cx="253435" cy="212902"/>
+          </a:xfrm>
+          <a:prstGeom prst="ellipse">
+            <a:avLst/>
+          </a:prstGeom>
+          <a:solidFill>
+            <a:schemeClr val="tx1"/>
+          </a:solidFill>
+          <a:ln>
+            <a:solidFill>
+              <a:schemeClr val="tx1"/>
+            </a:solidFill>
+          </a:ln>
+        </p:spPr>
+        <p:style>
+          <a:lnRef idx="2">
+            <a:schemeClr val="accent1">
+              <a:shade val="50000"/>
+            </a:schemeClr>
+          </a:lnRef>
+          <a:fillRef idx="1">
+            <a:schemeClr val="accent1"/>
+          </a:fillRef>
+          <a:effectRef idx="0">
+            <a:schemeClr val="accent1"/>
+          </a:effectRef>
+          <a:fontRef idx="minor">
+            <a:schemeClr val="lt1"/>
+          </a:fontRef>
+        </p:style>
+        <p:txBody>
+          <a:bodyPr lIns="0" tIns="0" rIns="0" bIns="0" rtlCol="0" anchor="ctr"/>
+          <a:lstStyle/>
+          <a:p>
+            <a:pPr algn="ctr"/>
+            <a:r>
+              <a:rPr lang="en-US" sz="800" dirty="0">
+                <a:latin typeface="Arial" panose="020B0604020202020204" pitchFamily="34" charset="0"/>
+                <a:cs typeface="Arial" panose="020B0604020202020204" pitchFamily="34" charset="0"/>
+              </a:rPr>
+              <a:t>3.3</a:t>
+            </a:r>
+          </a:p>
+        </p:txBody>
+      </p:sp>
+      <p:sp>
+        <p:nvSpPr>
+          <p:cNvPr id="80" name="Oval 79">
+            <a:extLst>
+              <a:ext uri="{FF2B5EF4-FFF2-40B4-BE49-F238E27FC236}">
+                <a16:creationId xmlns:a16="http://schemas.microsoft.com/office/drawing/2014/main" id="{48C4D317-93F4-5641-8DFB-C87230F448BF}"/>
+              </a:ext>
+            </a:extLst>
+          </p:cNvPr>
+          <p:cNvSpPr/>
+          <p:nvPr/>
+        </p:nvSpPr>
+        <p:spPr>
+          <a:xfrm>
+            <a:off x="7957680" y="4938098"/>
             <a:ext cx="253435" cy="212902"/>
           </a:xfrm>
           <a:prstGeom prst="ellipse">

</xml_diff>